<commit_message>
Updated PPT for lesson 1
</commit_message>
<xml_diff>
--- a/PythonForTestere.pptx
+++ b/PythonForTestere.pptx
@@ -5,7 +5,7 @@
     <p:sldMasterId id="2147483648" r:id="rId1"/>
   </p:sldMasterIdLst>
   <p:notesMasterIdLst>
-    <p:notesMasterId r:id="rId12"/>
+    <p:notesMasterId r:id="rId11"/>
   </p:notesMasterIdLst>
   <p:sldIdLst>
     <p:sldId id="256" r:id="rId2"/>
@@ -17,7 +17,6 @@
     <p:sldId id="267" r:id="rId8"/>
     <p:sldId id="261" r:id="rId9"/>
     <p:sldId id="266" r:id="rId10"/>
-    <p:sldId id="268" r:id="rId11"/>
   </p:sldIdLst>
   <p:sldSz cx="12192000" cy="6858000"/>
   <p:notesSz cx="6858000" cy="9144000"/>
@@ -206,7 +205,7 @@
           <a:p>
             <a:fld id="{7D3F7460-931B-4A2D-A308-85061EA3517E}" type="datetimeFigureOut">
               <a:rPr lang="nb-NO" smtClean="0"/>
-              <a:t>23.04.2025</a:t>
+              <a:t>24.04.2025</a:t>
             </a:fld>
             <a:endParaRPr lang="nb-NO"/>
           </a:p>
@@ -623,7 +622,7 @@
           <a:p>
             <a:fld id="{4845AEC2-F393-49E6-9D9D-A942C4543987}" type="datetimeFigureOut">
               <a:rPr lang="nb-NO" smtClean="0"/>
-              <a:t>23.04.2025</a:t>
+              <a:t>24.04.2025</a:t>
             </a:fld>
             <a:endParaRPr lang="nb-NO"/>
           </a:p>
@@ -823,7 +822,7 @@
           <a:p>
             <a:fld id="{4845AEC2-F393-49E6-9D9D-A942C4543987}" type="datetimeFigureOut">
               <a:rPr lang="nb-NO" smtClean="0"/>
-              <a:t>23.04.2025</a:t>
+              <a:t>24.04.2025</a:t>
             </a:fld>
             <a:endParaRPr lang="nb-NO"/>
           </a:p>
@@ -1033,7 +1032,7 @@
           <a:p>
             <a:fld id="{4845AEC2-F393-49E6-9D9D-A942C4543987}" type="datetimeFigureOut">
               <a:rPr lang="nb-NO" smtClean="0"/>
-              <a:t>23.04.2025</a:t>
+              <a:t>24.04.2025</a:t>
             </a:fld>
             <a:endParaRPr lang="nb-NO"/>
           </a:p>
@@ -1233,7 +1232,7 @@
           <a:p>
             <a:fld id="{4845AEC2-F393-49E6-9D9D-A942C4543987}" type="datetimeFigureOut">
               <a:rPr lang="nb-NO" smtClean="0"/>
-              <a:t>23.04.2025</a:t>
+              <a:t>24.04.2025</a:t>
             </a:fld>
             <a:endParaRPr lang="nb-NO"/>
           </a:p>
@@ -1509,7 +1508,7 @@
           <a:p>
             <a:fld id="{4845AEC2-F393-49E6-9D9D-A942C4543987}" type="datetimeFigureOut">
               <a:rPr lang="nb-NO" smtClean="0"/>
-              <a:t>23.04.2025</a:t>
+              <a:t>24.04.2025</a:t>
             </a:fld>
             <a:endParaRPr lang="nb-NO"/>
           </a:p>
@@ -1777,7 +1776,7 @@
           <a:p>
             <a:fld id="{4845AEC2-F393-49E6-9D9D-A942C4543987}" type="datetimeFigureOut">
               <a:rPr lang="nb-NO" smtClean="0"/>
-              <a:t>23.04.2025</a:t>
+              <a:t>24.04.2025</a:t>
             </a:fld>
             <a:endParaRPr lang="nb-NO"/>
           </a:p>
@@ -2192,7 +2191,7 @@
           <a:p>
             <a:fld id="{4845AEC2-F393-49E6-9D9D-A942C4543987}" type="datetimeFigureOut">
               <a:rPr lang="nb-NO" smtClean="0"/>
-              <a:t>23.04.2025</a:t>
+              <a:t>24.04.2025</a:t>
             </a:fld>
             <a:endParaRPr lang="nb-NO"/>
           </a:p>
@@ -2334,7 +2333,7 @@
           <a:p>
             <a:fld id="{4845AEC2-F393-49E6-9D9D-A942C4543987}" type="datetimeFigureOut">
               <a:rPr lang="nb-NO" smtClean="0"/>
-              <a:t>23.04.2025</a:t>
+              <a:t>24.04.2025</a:t>
             </a:fld>
             <a:endParaRPr lang="nb-NO"/>
           </a:p>
@@ -2447,7 +2446,7 @@
           <a:p>
             <a:fld id="{4845AEC2-F393-49E6-9D9D-A942C4543987}" type="datetimeFigureOut">
               <a:rPr lang="nb-NO" smtClean="0"/>
-              <a:t>23.04.2025</a:t>
+              <a:t>24.04.2025</a:t>
             </a:fld>
             <a:endParaRPr lang="nb-NO"/>
           </a:p>
@@ -2760,7 +2759,7 @@
           <a:p>
             <a:fld id="{4845AEC2-F393-49E6-9D9D-A942C4543987}" type="datetimeFigureOut">
               <a:rPr lang="nb-NO" smtClean="0"/>
-              <a:t>23.04.2025</a:t>
+              <a:t>24.04.2025</a:t>
             </a:fld>
             <a:endParaRPr lang="nb-NO"/>
           </a:p>
@@ -3049,7 +3048,7 @@
           <a:p>
             <a:fld id="{4845AEC2-F393-49E6-9D9D-A942C4543987}" type="datetimeFigureOut">
               <a:rPr lang="nb-NO" smtClean="0"/>
-              <a:t>23.04.2025</a:t>
+              <a:t>24.04.2025</a:t>
             </a:fld>
             <a:endParaRPr lang="nb-NO"/>
           </a:p>
@@ -3297,7 +3296,7 @@
           <a:p>
             <a:fld id="{4845AEC2-F393-49E6-9D9D-A942C4543987}" type="datetimeFigureOut">
               <a:rPr lang="nb-NO" smtClean="0"/>
-              <a:t>23.04.2025</a:t>
+              <a:t>24.04.2025</a:t>
             </a:fld>
             <a:endParaRPr lang="nb-NO"/>
           </a:p>
@@ -4195,175 +4194,6 @@
     <p:extLst>
       <p:ext uri="{BB962C8B-B14F-4D97-AF65-F5344CB8AC3E}">
         <p14:creationId xmlns:p14="http://schemas.microsoft.com/office/powerpoint/2010/main" val="3539338909"/>
-      </p:ext>
-    </p:extLst>
-  </p:cSld>
-  <p:clrMapOvr>
-    <a:masterClrMapping/>
-  </p:clrMapOvr>
-</p:sld>
-</file>
-
-<file path=ppt/slides/slide10.xml><?xml version="1.0" encoding="utf-8"?>
-<p:sld xmlns:a="http://schemas.openxmlformats.org/drawingml/2006/main" xmlns:r="http://schemas.openxmlformats.org/officeDocument/2006/relationships" xmlns:p="http://schemas.openxmlformats.org/presentationml/2006/main">
-  <p:cSld>
-    <p:spTree>
-      <p:nvGrpSpPr>
-        <p:cNvPr id="1" name=""/>
-        <p:cNvGrpSpPr/>
-        <p:nvPr/>
-      </p:nvGrpSpPr>
-      <p:grpSpPr>
-        <a:xfrm>
-          <a:off x="0" y="0"/>
-          <a:ext cx="0" cy="0"/>
-          <a:chOff x="0" y="0"/>
-          <a:chExt cx="0" cy="0"/>
-        </a:xfrm>
-      </p:grpSpPr>
-      <p:sp>
-        <p:nvSpPr>
-          <p:cNvPr id="2" name="Title 1">
-            <a:extLst>
-              <a:ext uri="{FF2B5EF4-FFF2-40B4-BE49-F238E27FC236}">
-                <a16:creationId xmlns:a16="http://schemas.microsoft.com/office/drawing/2014/main" id="{A8BF8DC0-1E08-9444-3721-1F1F8FF0B50F}"/>
-              </a:ext>
-            </a:extLst>
-          </p:cNvPr>
-          <p:cNvSpPr>
-            <a:spLocks noGrp="1"/>
-          </p:cNvSpPr>
-          <p:nvPr>
-            <p:ph type="title"/>
-          </p:nvPr>
-        </p:nvSpPr>
-        <p:spPr/>
-        <p:txBody>
-          <a:bodyPr/>
-          <a:lstStyle/>
-          <a:p>
-            <a:r>
-              <a:rPr lang="en-US" dirty="0"/>
-              <a:t>Exercise 2</a:t>
-            </a:r>
-            <a:endParaRPr lang="nb-NO" dirty="0"/>
-          </a:p>
-        </p:txBody>
-      </p:sp>
-      <p:sp>
-        <p:nvSpPr>
-          <p:cNvPr id="3" name="Content Placeholder 2">
-            <a:extLst>
-              <a:ext uri="{FF2B5EF4-FFF2-40B4-BE49-F238E27FC236}">
-                <a16:creationId xmlns:a16="http://schemas.microsoft.com/office/drawing/2014/main" id="{6704C614-4CCB-8569-6384-1117DD37EC28}"/>
-              </a:ext>
-            </a:extLst>
-          </p:cNvPr>
-          <p:cNvSpPr>
-            <a:spLocks noGrp="1"/>
-          </p:cNvSpPr>
-          <p:nvPr>
-            <p:ph idx="1"/>
-          </p:nvPr>
-        </p:nvSpPr>
-        <p:spPr/>
-        <p:txBody>
-          <a:bodyPr>
-            <a:normAutofit fontScale="92500" lnSpcReduction="20000"/>
-          </a:bodyPr>
-          <a:lstStyle/>
-          <a:p>
-            <a:pPr marL="0" indent="0">
-              <a:buNone/>
-            </a:pPr>
-            <a:r>
-              <a:rPr lang="en-US" dirty="0"/>
-              <a:t>Create a function that accepts an age and returns the following:</a:t>
-            </a:r>
-          </a:p>
-          <a:p>
-            <a:r>
-              <a:rPr lang="en-US" dirty="0"/>
-              <a:t>age &lt; 0 : “Error”</a:t>
-            </a:r>
-          </a:p>
-          <a:p>
-            <a:r>
-              <a:rPr lang="en-US" dirty="0"/>
-              <a:t>age == 0 “Home”</a:t>
-            </a:r>
-          </a:p>
-          <a:p>
-            <a:r>
-              <a:rPr lang="en-US" dirty="0"/>
-              <a:t>age 1-5: “</a:t>
-            </a:r>
-            <a:r>
-              <a:rPr lang="en-US" dirty="0" err="1"/>
-              <a:t>Kindergarden</a:t>
-            </a:r>
-            <a:r>
-              <a:rPr lang="en-US" dirty="0"/>
-              <a:t>”</a:t>
-            </a:r>
-          </a:p>
-          <a:p>
-            <a:r>
-              <a:rPr lang="en-US" dirty="0"/>
-              <a:t>age 6-15: “School”</a:t>
-            </a:r>
-          </a:p>
-          <a:p>
-            <a:r>
-              <a:rPr lang="en-US" dirty="0"/>
-              <a:t>age 16-18: “College”</a:t>
-            </a:r>
-          </a:p>
-          <a:p>
-            <a:r>
-              <a:rPr lang="en-US" dirty="0"/>
-              <a:t>age &gt; 18: “Work or university”</a:t>
-            </a:r>
-          </a:p>
-          <a:p>
-            <a:pPr marL="0" indent="0">
-              <a:buNone/>
-            </a:pPr>
-            <a:endParaRPr lang="en-US" dirty="0"/>
-          </a:p>
-          <a:p>
-            <a:pPr marL="0" indent="0">
-              <a:buNone/>
-            </a:pPr>
-            <a:r>
-              <a:rPr lang="en-US" dirty="0"/>
-              <a:t>Make the program take user input and write the result. </a:t>
-            </a:r>
-          </a:p>
-          <a:p>
-            <a:pPr marL="0" indent="0">
-              <a:buNone/>
-            </a:pPr>
-            <a:r>
-              <a:rPr lang="en-US" dirty="0"/>
-              <a:t>Remember unit test</a:t>
-            </a:r>
-          </a:p>
-          <a:p>
-            <a:endParaRPr lang="en-US" dirty="0"/>
-          </a:p>
-          <a:p>
-            <a:pPr marL="0" indent="0">
-              <a:buNone/>
-            </a:pPr>
-            <a:endParaRPr lang="nb-NO" dirty="0"/>
-          </a:p>
-        </p:txBody>
-      </p:sp>
-    </p:spTree>
-    <p:extLst>
-      <p:ext uri="{BB962C8B-B14F-4D97-AF65-F5344CB8AC3E}">
-        <p14:creationId xmlns:p14="http://schemas.microsoft.com/office/powerpoint/2010/main" val="1761882379"/>
       </p:ext>
     </p:extLst>
   </p:cSld>

</xml_diff>

<commit_message>
Updated presentation after lesson 2
</commit_message>
<xml_diff>
--- a/PythonForTestere.pptx
+++ b/PythonForTestere.pptx
@@ -5,7 +5,7 @@
     <p:sldMasterId id="2147483648" r:id="rId1"/>
   </p:sldMasterIdLst>
   <p:notesMasterIdLst>
-    <p:notesMasterId r:id="rId11"/>
+    <p:notesMasterId r:id="rId13"/>
   </p:notesMasterIdLst>
   <p:sldIdLst>
     <p:sldId id="256" r:id="rId2"/>
@@ -17,6 +17,8 @@
     <p:sldId id="267" r:id="rId8"/>
     <p:sldId id="261" r:id="rId9"/>
     <p:sldId id="266" r:id="rId10"/>
+    <p:sldId id="269" r:id="rId11"/>
+    <p:sldId id="268" r:id="rId12"/>
   </p:sldIdLst>
   <p:sldSz cx="12192000" cy="6858000"/>
   <p:notesSz cx="6858000" cy="9144000"/>
@@ -205,7 +207,7 @@
           <a:p>
             <a:fld id="{7D3F7460-931B-4A2D-A308-85061EA3517E}" type="datetimeFigureOut">
               <a:rPr lang="nb-NO" smtClean="0"/>
-              <a:t>24.04.2025</a:t>
+              <a:t>28.04.2025</a:t>
             </a:fld>
             <a:endParaRPr lang="nb-NO"/>
           </a:p>
@@ -622,7 +624,7 @@
           <a:p>
             <a:fld id="{4845AEC2-F393-49E6-9D9D-A942C4543987}" type="datetimeFigureOut">
               <a:rPr lang="nb-NO" smtClean="0"/>
-              <a:t>24.04.2025</a:t>
+              <a:t>28.04.2025</a:t>
             </a:fld>
             <a:endParaRPr lang="nb-NO"/>
           </a:p>
@@ -822,7 +824,7 @@
           <a:p>
             <a:fld id="{4845AEC2-F393-49E6-9D9D-A942C4543987}" type="datetimeFigureOut">
               <a:rPr lang="nb-NO" smtClean="0"/>
-              <a:t>24.04.2025</a:t>
+              <a:t>28.04.2025</a:t>
             </a:fld>
             <a:endParaRPr lang="nb-NO"/>
           </a:p>
@@ -1032,7 +1034,7 @@
           <a:p>
             <a:fld id="{4845AEC2-F393-49E6-9D9D-A942C4543987}" type="datetimeFigureOut">
               <a:rPr lang="nb-NO" smtClean="0"/>
-              <a:t>24.04.2025</a:t>
+              <a:t>28.04.2025</a:t>
             </a:fld>
             <a:endParaRPr lang="nb-NO"/>
           </a:p>
@@ -1232,7 +1234,7 @@
           <a:p>
             <a:fld id="{4845AEC2-F393-49E6-9D9D-A942C4543987}" type="datetimeFigureOut">
               <a:rPr lang="nb-NO" smtClean="0"/>
-              <a:t>24.04.2025</a:t>
+              <a:t>28.04.2025</a:t>
             </a:fld>
             <a:endParaRPr lang="nb-NO"/>
           </a:p>
@@ -1508,7 +1510,7 @@
           <a:p>
             <a:fld id="{4845AEC2-F393-49E6-9D9D-A942C4543987}" type="datetimeFigureOut">
               <a:rPr lang="nb-NO" smtClean="0"/>
-              <a:t>24.04.2025</a:t>
+              <a:t>28.04.2025</a:t>
             </a:fld>
             <a:endParaRPr lang="nb-NO"/>
           </a:p>
@@ -1776,7 +1778,7 @@
           <a:p>
             <a:fld id="{4845AEC2-F393-49E6-9D9D-A942C4543987}" type="datetimeFigureOut">
               <a:rPr lang="nb-NO" smtClean="0"/>
-              <a:t>24.04.2025</a:t>
+              <a:t>28.04.2025</a:t>
             </a:fld>
             <a:endParaRPr lang="nb-NO"/>
           </a:p>
@@ -2191,7 +2193,7 @@
           <a:p>
             <a:fld id="{4845AEC2-F393-49E6-9D9D-A942C4543987}" type="datetimeFigureOut">
               <a:rPr lang="nb-NO" smtClean="0"/>
-              <a:t>24.04.2025</a:t>
+              <a:t>28.04.2025</a:t>
             </a:fld>
             <a:endParaRPr lang="nb-NO"/>
           </a:p>
@@ -2333,7 +2335,7 @@
           <a:p>
             <a:fld id="{4845AEC2-F393-49E6-9D9D-A942C4543987}" type="datetimeFigureOut">
               <a:rPr lang="nb-NO" smtClean="0"/>
-              <a:t>24.04.2025</a:t>
+              <a:t>28.04.2025</a:t>
             </a:fld>
             <a:endParaRPr lang="nb-NO"/>
           </a:p>
@@ -2446,7 +2448,7 @@
           <a:p>
             <a:fld id="{4845AEC2-F393-49E6-9D9D-A942C4543987}" type="datetimeFigureOut">
               <a:rPr lang="nb-NO" smtClean="0"/>
-              <a:t>24.04.2025</a:t>
+              <a:t>28.04.2025</a:t>
             </a:fld>
             <a:endParaRPr lang="nb-NO"/>
           </a:p>
@@ -2759,7 +2761,7 @@
           <a:p>
             <a:fld id="{4845AEC2-F393-49E6-9D9D-A942C4543987}" type="datetimeFigureOut">
               <a:rPr lang="nb-NO" smtClean="0"/>
-              <a:t>24.04.2025</a:t>
+              <a:t>28.04.2025</a:t>
             </a:fld>
             <a:endParaRPr lang="nb-NO"/>
           </a:p>
@@ -3048,7 +3050,7 @@
           <a:p>
             <a:fld id="{4845AEC2-F393-49E6-9D9D-A942C4543987}" type="datetimeFigureOut">
               <a:rPr lang="nb-NO" smtClean="0"/>
-              <a:t>24.04.2025</a:t>
+              <a:t>28.04.2025</a:t>
             </a:fld>
             <a:endParaRPr lang="nb-NO"/>
           </a:p>
@@ -3296,7 +3298,7 @@
           <a:p>
             <a:fld id="{4845AEC2-F393-49E6-9D9D-A942C4543987}" type="datetimeFigureOut">
               <a:rPr lang="nb-NO" smtClean="0"/>
-              <a:t>24.04.2025</a:t>
+              <a:t>28.04.2025</a:t>
             </a:fld>
             <a:endParaRPr lang="nb-NO"/>
           </a:p>
@@ -4194,6 +4196,322 @@
     <p:extLst>
       <p:ext uri="{BB962C8B-B14F-4D97-AF65-F5344CB8AC3E}">
         <p14:creationId xmlns:p14="http://schemas.microsoft.com/office/powerpoint/2010/main" val="3539338909"/>
+      </p:ext>
+    </p:extLst>
+  </p:cSld>
+  <p:clrMapOvr>
+    <a:masterClrMapping/>
+  </p:clrMapOvr>
+</p:sld>
+</file>
+
+<file path=ppt/slides/slide10.xml><?xml version="1.0" encoding="utf-8"?>
+<p:sld xmlns:a="http://schemas.openxmlformats.org/drawingml/2006/main" xmlns:r="http://schemas.openxmlformats.org/officeDocument/2006/relationships" xmlns:p="http://schemas.openxmlformats.org/presentationml/2006/main">
+  <p:cSld>
+    <p:spTree>
+      <p:nvGrpSpPr>
+        <p:cNvPr id="1" name=""/>
+        <p:cNvGrpSpPr/>
+        <p:nvPr/>
+      </p:nvGrpSpPr>
+      <p:grpSpPr>
+        <a:xfrm>
+          <a:off x="0" y="0"/>
+          <a:ext cx="0" cy="0"/>
+          <a:chOff x="0" y="0"/>
+          <a:chExt cx="0" cy="0"/>
+        </a:xfrm>
+      </p:grpSpPr>
+      <p:sp>
+        <p:nvSpPr>
+          <p:cNvPr id="2" name="Title 1">
+            <a:extLst>
+              <a:ext uri="{FF2B5EF4-FFF2-40B4-BE49-F238E27FC236}">
+                <a16:creationId xmlns:a16="http://schemas.microsoft.com/office/drawing/2014/main" id="{686F80C6-0EBE-DDFD-330E-48D85908E600}"/>
+              </a:ext>
+            </a:extLst>
+          </p:cNvPr>
+          <p:cNvSpPr>
+            <a:spLocks noGrp="1"/>
+          </p:cNvSpPr>
+          <p:nvPr>
+            <p:ph type="title"/>
+          </p:nvPr>
+        </p:nvSpPr>
+        <p:spPr/>
+        <p:txBody>
+          <a:bodyPr/>
+          <a:lstStyle/>
+          <a:p>
+            <a:r>
+              <a:rPr lang="en-US" dirty="0"/>
+              <a:t>Test Driven Development (TDD)</a:t>
+            </a:r>
+            <a:endParaRPr lang="nb-NO" dirty="0"/>
+          </a:p>
+        </p:txBody>
+      </p:sp>
+      <p:sp>
+        <p:nvSpPr>
+          <p:cNvPr id="3" name="Content Placeholder 2">
+            <a:extLst>
+              <a:ext uri="{FF2B5EF4-FFF2-40B4-BE49-F238E27FC236}">
+                <a16:creationId xmlns:a16="http://schemas.microsoft.com/office/drawing/2014/main" id="{AD86E65D-99DA-8332-0086-736C739CABA5}"/>
+              </a:ext>
+            </a:extLst>
+          </p:cNvPr>
+          <p:cNvSpPr>
+            <a:spLocks noGrp="1"/>
+          </p:cNvSpPr>
+          <p:nvPr>
+            <p:ph idx="1"/>
+          </p:nvPr>
+        </p:nvSpPr>
+        <p:spPr/>
+        <p:txBody>
+          <a:bodyPr/>
+          <a:lstStyle/>
+          <a:p>
+            <a:pPr marL="514350" indent="-514350">
+              <a:buAutoNum type="arabicPeriod"/>
+            </a:pPr>
+            <a:r>
+              <a:rPr lang="en-US" dirty="0"/>
+              <a:t>Make a simple unit test</a:t>
+            </a:r>
+          </a:p>
+          <a:p>
+            <a:pPr marL="514350" indent="-514350">
+              <a:buAutoNum type="arabicPeriod"/>
+            </a:pPr>
+            <a:r>
+              <a:rPr lang="en-US" dirty="0"/>
+              <a:t>Ensure that the test fails</a:t>
+            </a:r>
+          </a:p>
+          <a:p>
+            <a:pPr marL="514350" indent="-514350">
+              <a:buAutoNum type="arabicPeriod"/>
+            </a:pPr>
+            <a:r>
+              <a:rPr lang="nb-NO" dirty="0" err="1"/>
+              <a:t>Implement</a:t>
+            </a:r>
+            <a:r>
+              <a:rPr lang="nb-NO" dirty="0"/>
+              <a:t> just </a:t>
+            </a:r>
+            <a:r>
+              <a:rPr lang="nb-NO" dirty="0" err="1"/>
+              <a:t>enough</a:t>
+            </a:r>
+            <a:r>
+              <a:rPr lang="nb-NO" dirty="0"/>
+              <a:t> </a:t>
+            </a:r>
+            <a:r>
+              <a:rPr lang="nb-NO" dirty="0" err="1"/>
+              <a:t>code</a:t>
+            </a:r>
+            <a:r>
+              <a:rPr lang="nb-NO" dirty="0"/>
+              <a:t> to make </a:t>
+            </a:r>
+            <a:r>
+              <a:rPr lang="nb-NO" dirty="0" err="1"/>
+              <a:t>the</a:t>
+            </a:r>
+            <a:r>
+              <a:rPr lang="nb-NO" dirty="0"/>
+              <a:t> test pass</a:t>
+            </a:r>
+          </a:p>
+          <a:p>
+            <a:pPr marL="514350" indent="-514350">
+              <a:buAutoNum type="arabicPeriod"/>
+            </a:pPr>
+            <a:r>
+              <a:rPr lang="nb-NO" dirty="0" err="1"/>
+              <a:t>Refactor</a:t>
+            </a:r>
+            <a:endParaRPr lang="nb-NO" dirty="0"/>
+          </a:p>
+          <a:p>
+            <a:pPr marL="514350" indent="-514350">
+              <a:buAutoNum type="arabicPeriod"/>
+            </a:pPr>
+            <a:r>
+              <a:rPr lang="nb-NO" dirty="0" err="1"/>
+              <a:t>Repeat</a:t>
+            </a:r>
+            <a:endParaRPr lang="nb-NO" dirty="0"/>
+          </a:p>
+        </p:txBody>
+      </p:sp>
+    </p:spTree>
+    <p:extLst>
+      <p:ext uri="{BB962C8B-B14F-4D97-AF65-F5344CB8AC3E}">
+        <p14:creationId xmlns:p14="http://schemas.microsoft.com/office/powerpoint/2010/main" val="1313788808"/>
+      </p:ext>
+    </p:extLst>
+  </p:cSld>
+  <p:clrMapOvr>
+    <a:masterClrMapping/>
+  </p:clrMapOvr>
+</p:sld>
+</file>
+
+<file path=ppt/slides/slide11.xml><?xml version="1.0" encoding="utf-8"?>
+<p:sld xmlns:a="http://schemas.openxmlformats.org/drawingml/2006/main" xmlns:r="http://schemas.openxmlformats.org/officeDocument/2006/relationships" xmlns:p="http://schemas.openxmlformats.org/presentationml/2006/main">
+  <p:cSld>
+    <p:spTree>
+      <p:nvGrpSpPr>
+        <p:cNvPr id="1" name=""/>
+        <p:cNvGrpSpPr/>
+        <p:nvPr/>
+      </p:nvGrpSpPr>
+      <p:grpSpPr>
+        <a:xfrm>
+          <a:off x="0" y="0"/>
+          <a:ext cx="0" cy="0"/>
+          <a:chOff x="0" y="0"/>
+          <a:chExt cx="0" cy="0"/>
+        </a:xfrm>
+      </p:grpSpPr>
+      <p:sp>
+        <p:nvSpPr>
+          <p:cNvPr id="2" name="Title 1">
+            <a:extLst>
+              <a:ext uri="{FF2B5EF4-FFF2-40B4-BE49-F238E27FC236}">
+                <a16:creationId xmlns:a16="http://schemas.microsoft.com/office/drawing/2014/main" id="{A8BF8DC0-1E08-9444-3721-1F1F8FF0B50F}"/>
+              </a:ext>
+            </a:extLst>
+          </p:cNvPr>
+          <p:cNvSpPr>
+            <a:spLocks noGrp="1"/>
+          </p:cNvSpPr>
+          <p:nvPr>
+            <p:ph type="title"/>
+          </p:nvPr>
+        </p:nvSpPr>
+        <p:spPr/>
+        <p:txBody>
+          <a:bodyPr/>
+          <a:lstStyle/>
+          <a:p>
+            <a:r>
+              <a:rPr lang="en-US" dirty="0"/>
+              <a:t>TDD Exercise</a:t>
+            </a:r>
+            <a:endParaRPr lang="nb-NO" dirty="0"/>
+          </a:p>
+        </p:txBody>
+      </p:sp>
+      <p:sp>
+        <p:nvSpPr>
+          <p:cNvPr id="3" name="Content Placeholder 2">
+            <a:extLst>
+              <a:ext uri="{FF2B5EF4-FFF2-40B4-BE49-F238E27FC236}">
+                <a16:creationId xmlns:a16="http://schemas.microsoft.com/office/drawing/2014/main" id="{6704C614-4CCB-8569-6384-1117DD37EC28}"/>
+              </a:ext>
+            </a:extLst>
+          </p:cNvPr>
+          <p:cNvSpPr>
+            <a:spLocks noGrp="1"/>
+          </p:cNvSpPr>
+          <p:nvPr>
+            <p:ph idx="1"/>
+          </p:nvPr>
+        </p:nvSpPr>
+        <p:spPr/>
+        <p:txBody>
+          <a:bodyPr>
+            <a:normAutofit fontScale="92500" lnSpcReduction="10000"/>
+          </a:bodyPr>
+          <a:lstStyle/>
+          <a:p>
+            <a:pPr marL="0" indent="0">
+              <a:buNone/>
+            </a:pPr>
+            <a:r>
+              <a:rPr lang="en-US" dirty="0"/>
+              <a:t>Create a function that accepts an age and returns the following:</a:t>
+            </a:r>
+          </a:p>
+          <a:p>
+            <a:r>
+              <a:rPr lang="en-US" dirty="0"/>
+              <a:t>age &lt; 0 : “Error”</a:t>
+            </a:r>
+          </a:p>
+          <a:p>
+            <a:r>
+              <a:rPr lang="en-US" dirty="0"/>
+              <a:t>age == 0 “Home”</a:t>
+            </a:r>
+          </a:p>
+          <a:p>
+            <a:r>
+              <a:rPr lang="en-US" dirty="0"/>
+              <a:t>age 1-5: “</a:t>
+            </a:r>
+            <a:r>
+              <a:rPr lang="en-US" dirty="0" err="1"/>
+              <a:t>Kindergarden</a:t>
+            </a:r>
+            <a:r>
+              <a:rPr lang="en-US" dirty="0"/>
+              <a:t>”</a:t>
+            </a:r>
+          </a:p>
+          <a:p>
+            <a:r>
+              <a:rPr lang="en-US" dirty="0"/>
+              <a:t>age 6-15: “School”</a:t>
+            </a:r>
+          </a:p>
+          <a:p>
+            <a:r>
+              <a:rPr lang="en-US" dirty="0"/>
+              <a:t>age 16-18: “College”</a:t>
+            </a:r>
+          </a:p>
+          <a:p>
+            <a:r>
+              <a:rPr lang="en-US" dirty="0"/>
+              <a:t>age &gt; 18: “Work or university”</a:t>
+            </a:r>
+          </a:p>
+          <a:p>
+            <a:pPr marL="0" indent="0">
+              <a:buNone/>
+            </a:pPr>
+            <a:endParaRPr lang="en-US" dirty="0"/>
+          </a:p>
+          <a:p>
+            <a:pPr marL="0" indent="0">
+              <a:buNone/>
+            </a:pPr>
+            <a:r>
+              <a:rPr lang="en-US" dirty="0"/>
+              <a:t>After completing the function using TDD, accept user input and write the result.</a:t>
+            </a:r>
+          </a:p>
+          <a:p>
+            <a:endParaRPr lang="en-US" dirty="0"/>
+          </a:p>
+          <a:p>
+            <a:pPr marL="0" indent="0">
+              <a:buNone/>
+            </a:pPr>
+            <a:endParaRPr lang="nb-NO" dirty="0"/>
+          </a:p>
+        </p:txBody>
+      </p:sp>
+    </p:spTree>
+    <p:extLst>
+      <p:ext uri="{BB962C8B-B14F-4D97-AF65-F5344CB8AC3E}">
+        <p14:creationId xmlns:p14="http://schemas.microsoft.com/office/powerpoint/2010/main" val="1761882379"/>
       </p:ext>
     </p:extLst>
   </p:cSld>

</xml_diff>